<commit_message>
Added Code, PPT, and Final Report
</commit_message>
<xml_diff>
--- a/Final Presentation - IM.pptx
+++ b/Final Presentation - IM.pptx
@@ -280,34 +280,1023 @@
 <p1510:revInfo xmlns:a="http://schemas.openxmlformats.org/drawingml/2006/main" xmlns:r="http://schemas.openxmlformats.org/officeDocument/2006/relationships" xmlns:p1510="http://schemas.microsoft.com/office/powerpoint/2015/10/main">
   <p1510:revLst>
     <p1510:client id="{05489FB6-1FEB-CF71-71B4-B11E8E4CC83D}" v="537" dt="2022-12-04T23:42:40.480"/>
+    <p1510:client id="{16EEC95D-074B-6EBC-7F7E-A563CAEE6D3A}" v="326" dt="2022-12-05T18:44:13.264"/>
     <p1510:client id="{1C7149D2-DA33-9384-606B-F3D2E4C570E8}" v="33" dt="2022-12-05T02:16:11.553"/>
     <p1510:client id="{5CC4592E-8E8B-294C-B87D-8B710BB0F673}" v="495" dt="2022-12-05T02:10:44.689"/>
     <p1510:client id="{7167E763-4DF3-CA1F-80E5-7C1953AE2662}" v="64" dt="2022-12-03T03:41:00.532"/>
+    <p1510:client id="{DD0FE3CE-7D0C-9817-CDEC-F41411F73CBA}" v="3" dt="2022-12-11T22:53:14.867"/>
+    <p1510:client id="{FA41B6BC-00E9-1BFE-E2F2-7976B15AA4CE}" v="1" dt="2022-12-05T18:37:56.703"/>
     <p1510:client id="{FD2A041D-51FA-D1D4-FA47-4702F2E4EDCF}" v="26" dt="2022-12-03T03:38:54.653"/>
   </p1510:revLst>
 </p1510:revInfo>
 </file>
 
-<file path=ppt/comments/modernComment_10F_B6386D45.xml><?xml version="1.0" encoding="utf-8"?>
-<p188:cmLst xmlns:a="http://schemas.openxmlformats.org/drawingml/2006/main" xmlns:r="http://schemas.openxmlformats.org/officeDocument/2006/relationships" xmlns:p188="http://schemas.microsoft.com/office/powerpoint/2018/8/main">
-  <p188:cm id="{A95AA024-054A-406D-9F42-5C592958C8E1}" authorId="{44083070-5801-4EA2-3E7A-9389E0F2C4E3}" created="2022-12-04T23:40:57.822">
-    <ac:deMkLst xmlns:ac="http://schemas.microsoft.com/office/drawing/2013/main/command">
-      <pc:docMk xmlns:pc="http://schemas.microsoft.com/office/powerpoint/2013/main/command"/>
-      <pc:sldMk xmlns:pc="http://schemas.microsoft.com/office/powerpoint/2013/main/command" cId="3057151301" sldId="271"/>
-      <ac:picMk id="3" creationId="{06777672-8632-294E-E84C-520DBA17C95C}"/>
-    </ac:deMkLst>
-    <p188:txBody>
-      <a:bodyPr/>
-      <a:lstStyle/>
-      <a:p>
-        <a:r>
-          <a:rPr lang="en-US"/>
-          <a:t>1700 military time = 5:00 P.M.</a:t>
-        </a:r>
-      </a:p>
-    </p188:txBody>
-  </p188:cm>
-</p188:cmLst>
+<file path=ppt/changesInfos/changesInfo1.xml><?xml version="1.0" encoding="utf-8"?>
+<pc:chgInfo xmlns:a="http://schemas.openxmlformats.org/drawingml/2006/main" xmlns:r="http://schemas.openxmlformats.org/officeDocument/2006/relationships" xmlns:ac="http://schemas.microsoft.com/office/drawing/2013/main/command" xmlns:pc="http://schemas.microsoft.com/office/powerpoint/2013/main/command">
+  <pc:docChgLst>
+    <pc:chgData name="Lieske, Sydney" userId="S::slieske7743@floridapoly.edu::96117bc7-a41d-4081-8f75-0129871cf8a3" providerId="AD" clId="Web-{7167E763-4DF3-CA1F-80E5-7C1953AE2662}"/>
+    <pc:docChg chg="addSld delSld modSld sldOrd">
+      <pc:chgData name="Lieske, Sydney" userId="S::slieske7743@floridapoly.edu::96117bc7-a41d-4081-8f75-0129871cf8a3" providerId="AD" clId="Web-{7167E763-4DF3-CA1F-80E5-7C1953AE2662}" dt="2022-12-03T03:41:00.532" v="51"/>
+      <pc:docMkLst>
+        <pc:docMk/>
+      </pc:docMkLst>
+      <pc:sldChg chg="modSp">
+        <pc:chgData name="Lieske, Sydney" userId="S::slieske7743@floridapoly.edu::96117bc7-a41d-4081-8f75-0129871cf8a3" providerId="AD" clId="Web-{7167E763-4DF3-CA1F-80E5-7C1953AE2662}" dt="2022-12-03T03:40:11.125" v="33" actId="20577"/>
+        <pc:sldMkLst>
+          <pc:docMk/>
+          <pc:sldMk cId="0" sldId="256"/>
+        </pc:sldMkLst>
+        <pc:spChg chg="mod">
+          <ac:chgData name="Lieske, Sydney" userId="S::slieske7743@floridapoly.edu::96117bc7-a41d-4081-8f75-0129871cf8a3" providerId="AD" clId="Web-{7167E763-4DF3-CA1F-80E5-7C1953AE2662}" dt="2022-12-03T03:40:11.125" v="33" actId="20577"/>
+          <ac:spMkLst>
+            <pc:docMk/>
+            <pc:sldMk cId="0" sldId="256"/>
+            <ac:spMk id="279" creationId="{00000000-0000-0000-0000-000000000000}"/>
+          </ac:spMkLst>
+        </pc:spChg>
+      </pc:sldChg>
+      <pc:sldChg chg="modSp">
+        <pc:chgData name="Lieske, Sydney" userId="S::slieske7743@floridapoly.edu::96117bc7-a41d-4081-8f75-0129871cf8a3" providerId="AD" clId="Web-{7167E763-4DF3-CA1F-80E5-7C1953AE2662}" dt="2022-12-03T03:40:00.500" v="29" actId="20577"/>
+        <pc:sldMkLst>
+          <pc:docMk/>
+          <pc:sldMk cId="0" sldId="257"/>
+        </pc:sldMkLst>
+        <pc:spChg chg="mod">
+          <ac:chgData name="Lieske, Sydney" userId="S::slieske7743@floridapoly.edu::96117bc7-a41d-4081-8f75-0129871cf8a3" providerId="AD" clId="Web-{7167E763-4DF3-CA1F-80E5-7C1953AE2662}" dt="2022-12-03T03:40:00.500" v="29" actId="20577"/>
+          <ac:spMkLst>
+            <pc:docMk/>
+            <pc:sldMk cId="0" sldId="257"/>
+            <ac:spMk id="287" creationId="{00000000-0000-0000-0000-000000000000}"/>
+          </ac:spMkLst>
+        </pc:spChg>
+      </pc:sldChg>
+      <pc:sldChg chg="modSp ord">
+        <pc:chgData name="Lieske, Sydney" userId="S::slieske7743@floridapoly.edu::96117bc7-a41d-4081-8f75-0129871cf8a3" providerId="AD" clId="Web-{7167E763-4DF3-CA1F-80E5-7C1953AE2662}" dt="2022-12-03T03:39:54.609" v="17" actId="20577"/>
+        <pc:sldMkLst>
+          <pc:docMk/>
+          <pc:sldMk cId="0" sldId="258"/>
+        </pc:sldMkLst>
+        <pc:spChg chg="mod">
+          <ac:chgData name="Lieske, Sydney" userId="S::slieske7743@floridapoly.edu::96117bc7-a41d-4081-8f75-0129871cf8a3" providerId="AD" clId="Web-{7167E763-4DF3-CA1F-80E5-7C1953AE2662}" dt="2022-12-03T03:39:54.609" v="17" actId="20577"/>
+          <ac:spMkLst>
+            <pc:docMk/>
+            <pc:sldMk cId="0" sldId="258"/>
+            <ac:spMk id="293" creationId="{00000000-0000-0000-0000-000000000000}"/>
+          </ac:spMkLst>
+        </pc:spChg>
+        <pc:spChg chg="mod">
+          <ac:chgData name="Lieske, Sydney" userId="S::slieske7743@floridapoly.edu::96117bc7-a41d-4081-8f75-0129871cf8a3" providerId="AD" clId="Web-{7167E763-4DF3-CA1F-80E5-7C1953AE2662}" dt="2022-12-03T03:39:51.359" v="15" actId="20577"/>
+          <ac:spMkLst>
+            <pc:docMk/>
+            <pc:sldMk cId="0" sldId="258"/>
+            <ac:spMk id="294" creationId="{00000000-0000-0000-0000-000000000000}"/>
+          </ac:spMkLst>
+        </pc:spChg>
+      </pc:sldChg>
+      <pc:sldChg chg="modSp del ord">
+        <pc:chgData name="Lieske, Sydney" userId="S::slieske7743@floridapoly.edu::96117bc7-a41d-4081-8f75-0129871cf8a3" providerId="AD" clId="Web-{7167E763-4DF3-CA1F-80E5-7C1953AE2662}" dt="2022-12-03T03:41:00.532" v="51"/>
+        <pc:sldMkLst>
+          <pc:docMk/>
+          <pc:sldMk cId="0" sldId="259"/>
+        </pc:sldMkLst>
+        <pc:spChg chg="mod">
+          <ac:chgData name="Lieske, Sydney" userId="S::slieske7743@floridapoly.edu::96117bc7-a41d-4081-8f75-0129871cf8a3" providerId="AD" clId="Web-{7167E763-4DF3-CA1F-80E5-7C1953AE2662}" dt="2022-12-03T03:40:47.204" v="47" actId="20577"/>
+          <ac:spMkLst>
+            <pc:docMk/>
+            <pc:sldMk cId="0" sldId="259"/>
+            <ac:spMk id="299" creationId="{00000000-0000-0000-0000-000000000000}"/>
+          </ac:spMkLst>
+        </pc:spChg>
+        <pc:spChg chg="mod">
+          <ac:chgData name="Lieske, Sydney" userId="S::slieske7743@floridapoly.edu::96117bc7-a41d-4081-8f75-0129871cf8a3" providerId="AD" clId="Web-{7167E763-4DF3-CA1F-80E5-7C1953AE2662}" dt="2022-12-03T03:40:34.376" v="42" actId="20577"/>
+          <ac:spMkLst>
+            <pc:docMk/>
+            <pc:sldMk cId="0" sldId="259"/>
+            <ac:spMk id="300" creationId="{00000000-0000-0000-0000-000000000000}"/>
+          </ac:spMkLst>
+        </pc:spChg>
+      </pc:sldChg>
+      <pc:sldChg chg="modSp add del">
+        <pc:chgData name="Lieske, Sydney" userId="S::slieske7743@floridapoly.edu::96117bc7-a41d-4081-8f75-0129871cf8a3" providerId="AD" clId="Web-{7167E763-4DF3-CA1F-80E5-7C1953AE2662}" dt="2022-12-03T03:40:57.235" v="50" actId="20577"/>
+        <pc:sldMkLst>
+          <pc:docMk/>
+          <pc:sldMk cId="0" sldId="261"/>
+        </pc:sldMkLst>
+        <pc:spChg chg="mod">
+          <ac:chgData name="Lieske, Sydney" userId="S::slieske7743@floridapoly.edu::96117bc7-a41d-4081-8f75-0129871cf8a3" providerId="AD" clId="Web-{7167E763-4DF3-CA1F-80E5-7C1953AE2662}" dt="2022-12-03T03:40:57.235" v="50" actId="20577"/>
+          <ac:spMkLst>
+            <pc:docMk/>
+            <pc:sldMk cId="0" sldId="261"/>
+            <ac:spMk id="312" creationId="{00000000-0000-0000-0000-000000000000}"/>
+          </ac:spMkLst>
+        </pc:spChg>
+      </pc:sldChg>
+    </pc:docChg>
+  </pc:docChgLst>
+  <pc:docChgLst>
+    <pc:chgData name="Lieske, Sydney" userId="S::slieske7743@floridapoly.edu::96117bc7-a41d-4081-8f75-0129871cf8a3" providerId="AD" clId="Web-{16EEC95D-074B-6EBC-7F7E-A563CAEE6D3A}"/>
+    <pc:docChg chg="modSld">
+      <pc:chgData name="Lieske, Sydney" userId="S::slieske7743@floridapoly.edu::96117bc7-a41d-4081-8f75-0129871cf8a3" providerId="AD" clId="Web-{16EEC95D-074B-6EBC-7F7E-A563CAEE6D3A}" dt="2022-12-05T18:44:11.529" v="320" actId="20577"/>
+      <pc:docMkLst>
+        <pc:docMk/>
+      </pc:docMkLst>
+      <pc:sldChg chg="modSp">
+        <pc:chgData name="Lieske, Sydney" userId="S::slieske7743@floridapoly.edu::96117bc7-a41d-4081-8f75-0129871cf8a3" providerId="AD" clId="Web-{16EEC95D-074B-6EBC-7F7E-A563CAEE6D3A}" dt="2022-12-05T18:41:05.398" v="319" actId="20577"/>
+        <pc:sldMkLst>
+          <pc:docMk/>
+          <pc:sldMk cId="0" sldId="260"/>
+        </pc:sldMkLst>
+        <pc:spChg chg="mod">
+          <ac:chgData name="Lieske, Sydney" userId="S::slieske7743@floridapoly.edu::96117bc7-a41d-4081-8f75-0129871cf8a3" providerId="AD" clId="Web-{16EEC95D-074B-6EBC-7F7E-A563CAEE6D3A}" dt="2022-12-05T18:40:00.770" v="302" actId="20577"/>
+          <ac:spMkLst>
+            <pc:docMk/>
+            <pc:sldMk cId="0" sldId="260"/>
+            <ac:spMk id="3" creationId="{4225EAE3-70F2-74D3-5477-4B0E3C958348}"/>
+          </ac:spMkLst>
+        </pc:spChg>
+        <pc:spChg chg="mod">
+          <ac:chgData name="Lieske, Sydney" userId="S::slieske7743@floridapoly.edu::96117bc7-a41d-4081-8f75-0129871cf8a3" providerId="AD" clId="Web-{16EEC95D-074B-6EBC-7F7E-A563CAEE6D3A}" dt="2022-12-05T18:41:05.398" v="319" actId="20577"/>
+          <ac:spMkLst>
+            <pc:docMk/>
+            <pc:sldMk cId="0" sldId="260"/>
+            <ac:spMk id="306" creationId="{00000000-0000-0000-0000-000000000000}"/>
+          </ac:spMkLst>
+        </pc:spChg>
+      </pc:sldChg>
+      <pc:sldChg chg="modSp">
+        <pc:chgData name="Lieske, Sydney" userId="S::slieske7743@floridapoly.edu::96117bc7-a41d-4081-8f75-0129871cf8a3" providerId="AD" clId="Web-{16EEC95D-074B-6EBC-7F7E-A563CAEE6D3A}" dt="2022-12-05T18:44:11.529" v="320" actId="20577"/>
+        <pc:sldMkLst>
+          <pc:docMk/>
+          <pc:sldMk cId="2615404381" sldId="267"/>
+        </pc:sldMkLst>
+        <pc:spChg chg="mod">
+          <ac:chgData name="Lieske, Sydney" userId="S::slieske7743@floridapoly.edu::96117bc7-a41d-4081-8f75-0129871cf8a3" providerId="AD" clId="Web-{16EEC95D-074B-6EBC-7F7E-A563CAEE6D3A}" dt="2022-12-05T18:44:11.529" v="320" actId="20577"/>
+          <ac:spMkLst>
+            <pc:docMk/>
+            <pc:sldMk cId="2615404381" sldId="267"/>
+            <ac:spMk id="313" creationId="{00000000-0000-0000-0000-000000000000}"/>
+          </ac:spMkLst>
+        </pc:spChg>
+      </pc:sldChg>
+    </pc:docChg>
+  </pc:docChgLst>
+  <pc:docChgLst>
+    <pc:chgData name="Morales, Isabella" userId="S::imorales7776@floridapoly.edu::2758b9e1-4793-489d-8e87-87815bbb135a" providerId="AD" clId="Web-{5CC4592E-8E8B-294C-B87D-8B710BB0F673}"/>
+    <pc:docChg chg="modSld">
+      <pc:chgData name="Morales, Isabella" userId="S::imorales7776@floridapoly.edu::2758b9e1-4793-489d-8e87-87815bbb135a" providerId="AD" clId="Web-{5CC4592E-8E8B-294C-B87D-8B710BB0F673}" dt="2022-12-05T02:10:44.689" v="493" actId="20577"/>
+      <pc:docMkLst>
+        <pc:docMk/>
+      </pc:docMkLst>
+      <pc:sldChg chg="modSp">
+        <pc:chgData name="Morales, Isabella" userId="S::imorales7776@floridapoly.edu::2758b9e1-4793-489d-8e87-87815bbb135a" providerId="AD" clId="Web-{5CC4592E-8E8B-294C-B87D-8B710BB0F673}" dt="2022-12-05T02:10:44.689" v="493" actId="20577"/>
+        <pc:sldMkLst>
+          <pc:docMk/>
+          <pc:sldMk cId="0" sldId="261"/>
+        </pc:sldMkLst>
+        <pc:spChg chg="mod">
+          <ac:chgData name="Morales, Isabella" userId="S::imorales7776@floridapoly.edu::2758b9e1-4793-489d-8e87-87815bbb135a" providerId="AD" clId="Web-{5CC4592E-8E8B-294C-B87D-8B710BB0F673}" dt="2022-12-05T02:10:44.689" v="493" actId="20577"/>
+          <ac:spMkLst>
+            <pc:docMk/>
+            <pc:sldMk cId="0" sldId="261"/>
+            <ac:spMk id="312" creationId="{00000000-0000-0000-0000-000000000000}"/>
+          </ac:spMkLst>
+        </pc:spChg>
+      </pc:sldChg>
+    </pc:docChg>
+  </pc:docChgLst>
+  <pc:docChgLst>
+    <pc:chgData name="Lieske, Sydney" userId="S::slieske7743@floridapoly.edu::96117bc7-a41d-4081-8f75-0129871cf8a3" providerId="AD" clId="Web-{FA41B6BC-00E9-1BFE-E2F2-7976B15AA4CE}"/>
+    <pc:docChg chg="">
+      <pc:chgData name="Lieske, Sydney" userId="S::slieske7743@floridapoly.edu::96117bc7-a41d-4081-8f75-0129871cf8a3" providerId="AD" clId="Web-{FA41B6BC-00E9-1BFE-E2F2-7976B15AA4CE}" dt="2022-12-05T18:37:56.703" v="0"/>
+      <pc:docMkLst>
+        <pc:docMk/>
+      </pc:docMkLst>
+      <pc:sldChg chg="delCm">
+        <pc:chgData name="Lieske, Sydney" userId="S::slieske7743@floridapoly.edu::96117bc7-a41d-4081-8f75-0129871cf8a3" providerId="AD" clId="Web-{FA41B6BC-00E9-1BFE-E2F2-7976B15AA4CE}" dt="2022-12-05T18:37:56.703" v="0"/>
+        <pc:sldMkLst>
+          <pc:docMk/>
+          <pc:sldMk cId="3057151301" sldId="271"/>
+        </pc:sldMkLst>
+      </pc:sldChg>
+    </pc:docChg>
+  </pc:docChgLst>
+  <pc:docChgLst>
+    <pc:chgData name="Lieske, Sydney" userId="S::slieske7743@floridapoly.edu::96117bc7-a41d-4081-8f75-0129871cf8a3" providerId="AD" clId="Web-{FD2A041D-51FA-D1D4-FA47-4702F2E4EDCF}"/>
+    <pc:docChg chg="delSld modSld">
+      <pc:chgData name="Lieske, Sydney" userId="S::slieske7743@floridapoly.edu::96117bc7-a41d-4081-8f75-0129871cf8a3" providerId="AD" clId="Web-{FD2A041D-51FA-D1D4-FA47-4702F2E4EDCF}" dt="2022-12-03T03:38:54.653" v="22"/>
+      <pc:docMkLst>
+        <pc:docMk/>
+      </pc:docMkLst>
+      <pc:sldChg chg="modSp">
+        <pc:chgData name="Lieske, Sydney" userId="S::slieske7743@floridapoly.edu::96117bc7-a41d-4081-8f75-0129871cf8a3" providerId="AD" clId="Web-{FD2A041D-51FA-D1D4-FA47-4702F2E4EDCF}" dt="2022-12-03T03:37:50.573" v="0" actId="20577"/>
+        <pc:sldMkLst>
+          <pc:docMk/>
+          <pc:sldMk cId="0" sldId="257"/>
+        </pc:sldMkLst>
+        <pc:spChg chg="mod">
+          <ac:chgData name="Lieske, Sydney" userId="S::slieske7743@floridapoly.edu::96117bc7-a41d-4081-8f75-0129871cf8a3" providerId="AD" clId="Web-{FD2A041D-51FA-D1D4-FA47-4702F2E4EDCF}" dt="2022-12-03T03:37:50.573" v="0" actId="20577"/>
+          <ac:spMkLst>
+            <pc:docMk/>
+            <pc:sldMk cId="0" sldId="257"/>
+            <ac:spMk id="288" creationId="{00000000-0000-0000-0000-000000000000}"/>
+          </ac:spMkLst>
+        </pc:spChg>
+      </pc:sldChg>
+      <pc:sldChg chg="modSp">
+        <pc:chgData name="Lieske, Sydney" userId="S::slieske7743@floridapoly.edu::96117bc7-a41d-4081-8f75-0129871cf8a3" providerId="AD" clId="Web-{FD2A041D-51FA-D1D4-FA47-4702F2E4EDCF}" dt="2022-12-03T03:37:57.886" v="3" actId="20577"/>
+        <pc:sldMkLst>
+          <pc:docMk/>
+          <pc:sldMk cId="0" sldId="258"/>
+        </pc:sldMkLst>
+        <pc:spChg chg="mod">
+          <ac:chgData name="Lieske, Sydney" userId="S::slieske7743@floridapoly.edu::96117bc7-a41d-4081-8f75-0129871cf8a3" providerId="AD" clId="Web-{FD2A041D-51FA-D1D4-FA47-4702F2E4EDCF}" dt="2022-12-03T03:37:57.886" v="3" actId="20577"/>
+          <ac:spMkLst>
+            <pc:docMk/>
+            <pc:sldMk cId="0" sldId="258"/>
+            <ac:spMk id="294" creationId="{00000000-0000-0000-0000-000000000000}"/>
+          </ac:spMkLst>
+        </pc:spChg>
+      </pc:sldChg>
+      <pc:sldChg chg="delSp modSp">
+        <pc:chgData name="Lieske, Sydney" userId="S::slieske7743@floridapoly.edu::96117bc7-a41d-4081-8f75-0129871cf8a3" providerId="AD" clId="Web-{FD2A041D-51FA-D1D4-FA47-4702F2E4EDCF}" dt="2022-12-03T03:38:08.042" v="7"/>
+        <pc:sldMkLst>
+          <pc:docMk/>
+          <pc:sldMk cId="0" sldId="259"/>
+        </pc:sldMkLst>
+        <pc:spChg chg="mod">
+          <ac:chgData name="Lieske, Sydney" userId="S::slieske7743@floridapoly.edu::96117bc7-a41d-4081-8f75-0129871cf8a3" providerId="AD" clId="Web-{FD2A041D-51FA-D1D4-FA47-4702F2E4EDCF}" dt="2022-12-03T03:38:06.855" v="6" actId="20577"/>
+          <ac:spMkLst>
+            <pc:docMk/>
+            <pc:sldMk cId="0" sldId="259"/>
+            <ac:spMk id="299" creationId="{00000000-0000-0000-0000-000000000000}"/>
+          </ac:spMkLst>
+        </pc:spChg>
+        <pc:spChg chg="mod">
+          <ac:chgData name="Lieske, Sydney" userId="S::slieske7743@floridapoly.edu::96117bc7-a41d-4081-8f75-0129871cf8a3" providerId="AD" clId="Web-{FD2A041D-51FA-D1D4-FA47-4702F2E4EDCF}" dt="2022-12-03T03:38:05.699" v="5" actId="20577"/>
+          <ac:spMkLst>
+            <pc:docMk/>
+            <pc:sldMk cId="0" sldId="259"/>
+            <ac:spMk id="300" creationId="{00000000-0000-0000-0000-000000000000}"/>
+          </ac:spMkLst>
+        </pc:spChg>
+        <pc:picChg chg="del">
+          <ac:chgData name="Lieske, Sydney" userId="S::slieske7743@floridapoly.edu::96117bc7-a41d-4081-8f75-0129871cf8a3" providerId="AD" clId="Web-{FD2A041D-51FA-D1D4-FA47-4702F2E4EDCF}" dt="2022-12-03T03:38:08.042" v="7"/>
+          <ac:picMkLst>
+            <pc:docMk/>
+            <pc:sldMk cId="0" sldId="259"/>
+            <ac:picMk id="301" creationId="{00000000-0000-0000-0000-000000000000}"/>
+          </ac:picMkLst>
+        </pc:picChg>
+      </pc:sldChg>
+      <pc:sldChg chg="modSp">
+        <pc:chgData name="Lieske, Sydney" userId="S::slieske7743@floridapoly.edu::96117bc7-a41d-4081-8f75-0129871cf8a3" providerId="AD" clId="Web-{FD2A041D-51FA-D1D4-FA47-4702F2E4EDCF}" dt="2022-12-03T03:38:43.919" v="15" actId="20577"/>
+        <pc:sldMkLst>
+          <pc:docMk/>
+          <pc:sldMk cId="0" sldId="260"/>
+        </pc:sldMkLst>
+        <pc:spChg chg="mod">
+          <ac:chgData name="Lieske, Sydney" userId="S::slieske7743@floridapoly.edu::96117bc7-a41d-4081-8f75-0129871cf8a3" providerId="AD" clId="Web-{FD2A041D-51FA-D1D4-FA47-4702F2E4EDCF}" dt="2022-12-03T03:38:43.919" v="15" actId="20577"/>
+          <ac:spMkLst>
+            <pc:docMk/>
+            <pc:sldMk cId="0" sldId="260"/>
+            <ac:spMk id="306" creationId="{00000000-0000-0000-0000-000000000000}"/>
+          </ac:spMkLst>
+        </pc:spChg>
+        <pc:spChg chg="mod">
+          <ac:chgData name="Lieske, Sydney" userId="S::slieske7743@floridapoly.edu::96117bc7-a41d-4081-8f75-0129871cf8a3" providerId="AD" clId="Web-{FD2A041D-51FA-D1D4-FA47-4702F2E4EDCF}" dt="2022-12-03T03:38:42.387" v="14" actId="20577"/>
+          <ac:spMkLst>
+            <pc:docMk/>
+            <pc:sldMk cId="0" sldId="260"/>
+            <ac:spMk id="307" creationId="{00000000-0000-0000-0000-000000000000}"/>
+          </ac:spMkLst>
+        </pc:spChg>
+      </pc:sldChg>
+      <pc:sldChg chg="modSp">
+        <pc:chgData name="Lieske, Sydney" userId="S::slieske7743@floridapoly.edu::96117bc7-a41d-4081-8f75-0129871cf8a3" providerId="AD" clId="Web-{FD2A041D-51FA-D1D4-FA47-4702F2E4EDCF}" dt="2022-12-03T03:38:52.138" v="19" actId="20577"/>
+        <pc:sldMkLst>
+          <pc:docMk/>
+          <pc:sldMk cId="0" sldId="261"/>
+        </pc:sldMkLst>
+        <pc:spChg chg="mod">
+          <ac:chgData name="Lieske, Sydney" userId="S::slieske7743@floridapoly.edu::96117bc7-a41d-4081-8f75-0129871cf8a3" providerId="AD" clId="Web-{FD2A041D-51FA-D1D4-FA47-4702F2E4EDCF}" dt="2022-12-03T03:38:52.138" v="19" actId="20577"/>
+          <ac:spMkLst>
+            <pc:docMk/>
+            <pc:sldMk cId="0" sldId="261"/>
+            <ac:spMk id="313" creationId="{00000000-0000-0000-0000-000000000000}"/>
+          </ac:spMkLst>
+        </pc:spChg>
+      </pc:sldChg>
+      <pc:sldChg chg="del">
+        <pc:chgData name="Lieske, Sydney" userId="S::slieske7743@floridapoly.edu::96117bc7-a41d-4081-8f75-0129871cf8a3" providerId="AD" clId="Web-{FD2A041D-51FA-D1D4-FA47-4702F2E4EDCF}" dt="2022-12-03T03:38:54.653" v="22"/>
+        <pc:sldMkLst>
+          <pc:docMk/>
+          <pc:sldMk cId="0" sldId="262"/>
+        </pc:sldMkLst>
+      </pc:sldChg>
+      <pc:sldChg chg="del">
+        <pc:chgData name="Lieske, Sydney" userId="S::slieske7743@floridapoly.edu::96117bc7-a41d-4081-8f75-0129871cf8a3" providerId="AD" clId="Web-{FD2A041D-51FA-D1D4-FA47-4702F2E4EDCF}" dt="2022-12-03T03:38:54.653" v="21"/>
+        <pc:sldMkLst>
+          <pc:docMk/>
+          <pc:sldMk cId="0" sldId="263"/>
+        </pc:sldMkLst>
+      </pc:sldChg>
+      <pc:sldChg chg="del">
+        <pc:chgData name="Lieske, Sydney" userId="S::slieske7743@floridapoly.edu::96117bc7-a41d-4081-8f75-0129871cf8a3" providerId="AD" clId="Web-{FD2A041D-51FA-D1D4-FA47-4702F2E4EDCF}" dt="2022-12-03T03:38:54.638" v="20"/>
+        <pc:sldMkLst>
+          <pc:docMk/>
+          <pc:sldMk cId="0" sldId="264"/>
+        </pc:sldMkLst>
+      </pc:sldChg>
+    </pc:docChg>
+  </pc:docChgLst>
+  <pc:docChgLst>
+    <pc:chgData name="Lieske, Sydney" userId="S::slieske7743@floridapoly.edu::96117bc7-a41d-4081-8f75-0129871cf8a3" providerId="AD" clId="Web-{DD0FE3CE-7D0C-9817-CDEC-F41411F73CBA}"/>
+    <pc:docChg chg="modSld">
+      <pc:chgData name="Lieske, Sydney" userId="S::slieske7743@floridapoly.edu::96117bc7-a41d-4081-8f75-0129871cf8a3" providerId="AD" clId="Web-{DD0FE3CE-7D0C-9817-CDEC-F41411F73CBA}" dt="2022-12-11T22:53:14.164" v="1"/>
+      <pc:docMkLst>
+        <pc:docMk/>
+      </pc:docMkLst>
+      <pc:sldChg chg="addSp delSp">
+        <pc:chgData name="Lieske, Sydney" userId="S::slieske7743@floridapoly.edu::96117bc7-a41d-4081-8f75-0129871cf8a3" providerId="AD" clId="Web-{DD0FE3CE-7D0C-9817-CDEC-F41411F73CBA}" dt="2022-12-11T22:53:14.164" v="1"/>
+        <pc:sldMkLst>
+          <pc:docMk/>
+          <pc:sldMk cId="981701434" sldId="270"/>
+        </pc:sldMkLst>
+        <pc:picChg chg="add del">
+          <ac:chgData name="Lieske, Sydney" userId="S::slieske7743@floridapoly.edu::96117bc7-a41d-4081-8f75-0129871cf8a3" providerId="AD" clId="Web-{DD0FE3CE-7D0C-9817-CDEC-F41411F73CBA}" dt="2022-12-11T22:53:14.164" v="1"/>
+          <ac:picMkLst>
+            <pc:docMk/>
+            <pc:sldMk cId="981701434" sldId="270"/>
+            <ac:picMk id="6" creationId="{96611C52-7FF1-3AD5-2F0D-F8C28F360FF7}"/>
+          </ac:picMkLst>
+        </pc:picChg>
+      </pc:sldChg>
+    </pc:docChg>
+  </pc:docChgLst>
+  <pc:docChgLst>
+    <pc:chgData name="Lieske, Sydney" userId="S::slieske7743@floridapoly.edu::96117bc7-a41d-4081-8f75-0129871cf8a3" providerId="AD" clId="Web-{05489FB6-1FEB-CF71-71B4-B11E8E4CC83D}"/>
+    <pc:docChg chg="mod addSld delSld modSld sldOrd">
+      <pc:chgData name="Lieske, Sydney" userId="S::slieske7743@floridapoly.edu::96117bc7-a41d-4081-8f75-0129871cf8a3" providerId="AD" clId="Web-{05489FB6-1FEB-CF71-71B4-B11E8E4CC83D}" dt="2022-12-04T23:42:40.480" v="506" actId="1076"/>
+      <pc:docMkLst>
+        <pc:docMk/>
+      </pc:docMkLst>
+      <pc:sldChg chg="modSp">
+        <pc:chgData name="Lieske, Sydney" userId="S::slieske7743@floridapoly.edu::96117bc7-a41d-4081-8f75-0129871cf8a3" providerId="AD" clId="Web-{05489FB6-1FEB-CF71-71B4-B11E8E4CC83D}" dt="2022-12-04T23:06:23.114" v="444" actId="20577"/>
+        <pc:sldMkLst>
+          <pc:docMk/>
+          <pc:sldMk cId="0" sldId="257"/>
+        </pc:sldMkLst>
+        <pc:spChg chg="mod">
+          <ac:chgData name="Lieske, Sydney" userId="S::slieske7743@floridapoly.edu::96117bc7-a41d-4081-8f75-0129871cf8a3" providerId="AD" clId="Web-{05489FB6-1FEB-CF71-71B4-B11E8E4CC83D}" dt="2022-12-04T23:06:23.114" v="444" actId="20577"/>
+          <ac:spMkLst>
+            <pc:docMk/>
+            <pc:sldMk cId="0" sldId="257"/>
+            <ac:spMk id="288" creationId="{00000000-0000-0000-0000-000000000000}"/>
+          </ac:spMkLst>
+        </pc:spChg>
+      </pc:sldChg>
+      <pc:sldChg chg="modSp">
+        <pc:chgData name="Lieske, Sydney" userId="S::slieske7743@floridapoly.edu::96117bc7-a41d-4081-8f75-0129871cf8a3" providerId="AD" clId="Web-{05489FB6-1FEB-CF71-71B4-B11E8E4CC83D}" dt="2022-12-04T22:01:22.821" v="124" actId="20577"/>
+        <pc:sldMkLst>
+          <pc:docMk/>
+          <pc:sldMk cId="0" sldId="258"/>
+        </pc:sldMkLst>
+        <pc:spChg chg="mod">
+          <ac:chgData name="Lieske, Sydney" userId="S::slieske7743@floridapoly.edu::96117bc7-a41d-4081-8f75-0129871cf8a3" providerId="AD" clId="Web-{05489FB6-1FEB-CF71-71B4-B11E8E4CC83D}" dt="2022-12-04T22:01:22.821" v="124" actId="20577"/>
+          <ac:spMkLst>
+            <pc:docMk/>
+            <pc:sldMk cId="0" sldId="258"/>
+            <ac:spMk id="293" creationId="{00000000-0000-0000-0000-000000000000}"/>
+          </ac:spMkLst>
+        </pc:spChg>
+      </pc:sldChg>
+      <pc:sldChg chg="addSp modSp">
+        <pc:chgData name="Lieske, Sydney" userId="S::slieske7743@floridapoly.edu::96117bc7-a41d-4081-8f75-0129871cf8a3" providerId="AD" clId="Web-{05489FB6-1FEB-CF71-71B4-B11E8E4CC83D}" dt="2022-12-04T23:06:46.333" v="456" actId="20577"/>
+        <pc:sldMkLst>
+          <pc:docMk/>
+          <pc:sldMk cId="0" sldId="260"/>
+        </pc:sldMkLst>
+        <pc:spChg chg="add mod">
+          <ac:chgData name="Lieske, Sydney" userId="S::slieske7743@floridapoly.edu::96117bc7-a41d-4081-8f75-0129871cf8a3" providerId="AD" clId="Web-{05489FB6-1FEB-CF71-71B4-B11E8E4CC83D}" dt="2022-12-04T21:57:45.661" v="54" actId="20577"/>
+          <ac:spMkLst>
+            <pc:docMk/>
+            <pc:sldMk cId="0" sldId="260"/>
+            <ac:spMk id="3" creationId="{4225EAE3-70F2-74D3-5477-4B0E3C958348}"/>
+          </ac:spMkLst>
+        </pc:spChg>
+        <pc:spChg chg="mod">
+          <ac:chgData name="Lieske, Sydney" userId="S::slieske7743@floridapoly.edu::96117bc7-a41d-4081-8f75-0129871cf8a3" providerId="AD" clId="Web-{05489FB6-1FEB-CF71-71B4-B11E8E4CC83D}" dt="2022-12-04T23:06:46.333" v="456" actId="20577"/>
+          <ac:spMkLst>
+            <pc:docMk/>
+            <pc:sldMk cId="0" sldId="260"/>
+            <ac:spMk id="306" creationId="{00000000-0000-0000-0000-000000000000}"/>
+          </ac:spMkLst>
+        </pc:spChg>
+        <pc:spChg chg="mod">
+          <ac:chgData name="Lieske, Sydney" userId="S::slieske7743@floridapoly.edu::96117bc7-a41d-4081-8f75-0129871cf8a3" providerId="AD" clId="Web-{05489FB6-1FEB-CF71-71B4-B11E8E4CC83D}" dt="2022-12-04T21:59:38.038" v="92" actId="20577"/>
+          <ac:spMkLst>
+            <pc:docMk/>
+            <pc:sldMk cId="0" sldId="260"/>
+            <ac:spMk id="307" creationId="{00000000-0000-0000-0000-000000000000}"/>
+          </ac:spMkLst>
+        </pc:spChg>
+      </pc:sldChg>
+      <pc:sldChg chg="modSp">
+        <pc:chgData name="Lieske, Sydney" userId="S::slieske7743@floridapoly.edu::96117bc7-a41d-4081-8f75-0129871cf8a3" providerId="AD" clId="Web-{05489FB6-1FEB-CF71-71B4-B11E8E4CC83D}" dt="2022-12-04T23:07:04.677" v="483" actId="20577"/>
+        <pc:sldMkLst>
+          <pc:docMk/>
+          <pc:sldMk cId="0" sldId="261"/>
+        </pc:sldMkLst>
+        <pc:spChg chg="mod">
+          <ac:chgData name="Lieske, Sydney" userId="S::slieske7743@floridapoly.edu::96117bc7-a41d-4081-8f75-0129871cf8a3" providerId="AD" clId="Web-{05489FB6-1FEB-CF71-71B4-B11E8E4CC83D}" dt="2022-12-04T23:07:04.677" v="483" actId="20577"/>
+          <ac:spMkLst>
+            <pc:docMk/>
+            <pc:sldMk cId="0" sldId="261"/>
+            <ac:spMk id="312" creationId="{00000000-0000-0000-0000-000000000000}"/>
+          </ac:spMkLst>
+        </pc:spChg>
+      </pc:sldChg>
+      <pc:sldChg chg="addSp delSp modSp add replId">
+        <pc:chgData name="Lieske, Sydney" userId="S::slieske7743@floridapoly.edu::96117bc7-a41d-4081-8f75-0129871cf8a3" providerId="AD" clId="Web-{05489FB6-1FEB-CF71-71B4-B11E8E4CC83D}" dt="2022-12-04T23:37:10.301" v="495" actId="20577"/>
+        <pc:sldMkLst>
+          <pc:docMk/>
+          <pc:sldMk cId="628800396" sldId="266"/>
+        </pc:sldMkLst>
+        <pc:spChg chg="del mod">
+          <ac:chgData name="Lieske, Sydney" userId="S::slieske7743@floridapoly.edu::96117bc7-a41d-4081-8f75-0129871cf8a3" providerId="AD" clId="Web-{05489FB6-1FEB-CF71-71B4-B11E8E4CC83D}" dt="2022-12-04T21:57:14.785" v="41"/>
+          <ac:spMkLst>
+            <pc:docMk/>
+            <pc:sldMk cId="628800396" sldId="266"/>
+            <ac:spMk id="3" creationId="{4225EAE3-70F2-74D3-5477-4B0E3C958348}"/>
+          </ac:spMkLst>
+        </pc:spChg>
+        <pc:spChg chg="add mod">
+          <ac:chgData name="Lieske, Sydney" userId="S::slieske7743@floridapoly.edu::96117bc7-a41d-4081-8f75-0129871cf8a3" providerId="AD" clId="Web-{05489FB6-1FEB-CF71-71B4-B11E8E4CC83D}" dt="2022-12-04T23:37:10.301" v="495" actId="20577"/>
+          <ac:spMkLst>
+            <pc:docMk/>
+            <pc:sldMk cId="628800396" sldId="266"/>
+            <ac:spMk id="4" creationId="{477A327B-086B-9793-9F15-7075FA80163E}"/>
+          </ac:spMkLst>
+        </pc:spChg>
+        <pc:spChg chg="mod">
+          <ac:chgData name="Lieske, Sydney" userId="S::slieske7743@floridapoly.edu::96117bc7-a41d-4081-8f75-0129871cf8a3" providerId="AD" clId="Web-{05489FB6-1FEB-CF71-71B4-B11E8E4CC83D}" dt="2022-12-04T23:05:18.331" v="436" actId="20577"/>
+          <ac:spMkLst>
+            <pc:docMk/>
+            <pc:sldMk cId="628800396" sldId="266"/>
+            <ac:spMk id="306" creationId="{00000000-0000-0000-0000-000000000000}"/>
+          </ac:spMkLst>
+        </pc:spChg>
+        <pc:spChg chg="mod">
+          <ac:chgData name="Lieske, Sydney" userId="S::slieske7743@floridapoly.edu::96117bc7-a41d-4081-8f75-0129871cf8a3" providerId="AD" clId="Web-{05489FB6-1FEB-CF71-71B4-B11E8E4CC83D}" dt="2022-12-04T22:03:57.464" v="142" actId="20577"/>
+          <ac:spMkLst>
+            <pc:docMk/>
+            <pc:sldMk cId="628800396" sldId="266"/>
+            <ac:spMk id="307" creationId="{00000000-0000-0000-0000-000000000000}"/>
+          </ac:spMkLst>
+        </pc:spChg>
+      </pc:sldChg>
+      <pc:sldChg chg="modSp add replId">
+        <pc:chgData name="Lieske, Sydney" userId="S::slieske7743@floridapoly.edu::96117bc7-a41d-4081-8f75-0129871cf8a3" providerId="AD" clId="Web-{05489FB6-1FEB-CF71-71B4-B11E8E4CC83D}" dt="2022-12-04T22:00:19.460" v="108" actId="20577"/>
+        <pc:sldMkLst>
+          <pc:docMk/>
+          <pc:sldMk cId="2615404381" sldId="267"/>
+        </pc:sldMkLst>
+        <pc:spChg chg="mod">
+          <ac:chgData name="Lieske, Sydney" userId="S::slieske7743@floridapoly.edu::96117bc7-a41d-4081-8f75-0129871cf8a3" providerId="AD" clId="Web-{05489FB6-1FEB-CF71-71B4-B11E8E4CC83D}" dt="2022-12-04T22:00:19.460" v="108" actId="20577"/>
+          <ac:spMkLst>
+            <pc:docMk/>
+            <pc:sldMk cId="2615404381" sldId="267"/>
+            <ac:spMk id="312" creationId="{00000000-0000-0000-0000-000000000000}"/>
+          </ac:spMkLst>
+        </pc:spChg>
+        <pc:spChg chg="mod">
+          <ac:chgData name="Lieske, Sydney" userId="S::slieske7743@floridapoly.edu::96117bc7-a41d-4081-8f75-0129871cf8a3" providerId="AD" clId="Web-{05489FB6-1FEB-CF71-71B4-B11E8E4CC83D}" dt="2022-12-04T22:00:16.757" v="106" actId="20577"/>
+          <ac:spMkLst>
+            <pc:docMk/>
+            <pc:sldMk cId="2615404381" sldId="267"/>
+            <ac:spMk id="313" creationId="{00000000-0000-0000-0000-000000000000}"/>
+          </ac:spMkLst>
+        </pc:spChg>
+      </pc:sldChg>
+      <pc:sldChg chg="add del replId">
+        <pc:chgData name="Lieske, Sydney" userId="S::slieske7743@floridapoly.edu::96117bc7-a41d-4081-8f75-0129871cf8a3" providerId="AD" clId="Web-{05489FB6-1FEB-CF71-71B4-B11E8E4CC83D}" dt="2022-12-04T22:00:08.413" v="96"/>
+        <pc:sldMkLst>
+          <pc:docMk/>
+          <pc:sldMk cId="3716480899" sldId="267"/>
+        </pc:sldMkLst>
+      </pc:sldChg>
+      <pc:sldChg chg="addSp delSp modSp add replId addCm delCm">
+        <pc:chgData name="Lieske, Sydney" userId="S::slieske7743@floridapoly.edu::96117bc7-a41d-4081-8f75-0129871cf8a3" providerId="AD" clId="Web-{05489FB6-1FEB-CF71-71B4-B11E8E4CC83D}" dt="2022-12-04T23:37:31.224" v="496"/>
+        <pc:sldMkLst>
+          <pc:docMk/>
+          <pc:sldMk cId="4247086857" sldId="268"/>
+        </pc:sldMkLst>
+        <pc:spChg chg="add del">
+          <ac:chgData name="Lieske, Sydney" userId="S::slieske7743@floridapoly.edu::96117bc7-a41d-4081-8f75-0129871cf8a3" providerId="AD" clId="Web-{05489FB6-1FEB-CF71-71B4-B11E8E4CC83D}" dt="2022-12-04T22:39:38.675" v="373"/>
+          <ac:spMkLst>
+            <pc:docMk/>
+            <pc:sldMk cId="4247086857" sldId="268"/>
+            <ac:spMk id="7" creationId="{D9B4DB7E-D89A-63B7-5F83-5FA79E327D44}"/>
+          </ac:spMkLst>
+        </pc:spChg>
+        <pc:spChg chg="add del mod">
+          <ac:chgData name="Lieske, Sydney" userId="S::slieske7743@floridapoly.edu::96117bc7-a41d-4081-8f75-0129871cf8a3" providerId="AD" clId="Web-{05489FB6-1FEB-CF71-71B4-B11E8E4CC83D}" dt="2022-12-04T22:42:35.663" v="393"/>
+          <ac:spMkLst>
+            <pc:docMk/>
+            <pc:sldMk cId="4247086857" sldId="268"/>
+            <ac:spMk id="8" creationId="{EE9A292C-5848-469E-A53E-3739D841D06D}"/>
+          </ac:spMkLst>
+        </pc:spChg>
+        <pc:spChg chg="add del mod ord">
+          <ac:chgData name="Lieske, Sydney" userId="S::slieske7743@floridapoly.edu::96117bc7-a41d-4081-8f75-0129871cf8a3" providerId="AD" clId="Web-{05489FB6-1FEB-CF71-71B4-B11E8E4CC83D}" dt="2022-12-04T22:42:34.616" v="392"/>
+          <ac:spMkLst>
+            <pc:docMk/>
+            <pc:sldMk cId="4247086857" sldId="268"/>
+            <ac:spMk id="9" creationId="{0E0F8B69-B726-BC0D-6230-C68706E8DF30}"/>
+          </ac:spMkLst>
+        </pc:spChg>
+        <pc:spChg chg="del mod">
+          <ac:chgData name="Lieske, Sydney" userId="S::slieske7743@floridapoly.edu::96117bc7-a41d-4081-8f75-0129871cf8a3" providerId="AD" clId="Web-{05489FB6-1FEB-CF71-71B4-B11E8E4CC83D}" dt="2022-12-04T22:22:06.008" v="184"/>
+          <ac:spMkLst>
+            <pc:docMk/>
+            <pc:sldMk cId="4247086857" sldId="268"/>
+            <ac:spMk id="306" creationId="{00000000-0000-0000-0000-000000000000}"/>
+          </ac:spMkLst>
+        </pc:spChg>
+        <pc:spChg chg="mod">
+          <ac:chgData name="Lieske, Sydney" userId="S::slieske7743@floridapoly.edu::96117bc7-a41d-4081-8f75-0129871cf8a3" providerId="AD" clId="Web-{05489FB6-1FEB-CF71-71B4-B11E8E4CC83D}" dt="2022-12-04T22:39:33.800" v="371" actId="1076"/>
+          <ac:spMkLst>
+            <pc:docMk/>
+            <pc:sldMk cId="4247086857" sldId="268"/>
+            <ac:spMk id="307" creationId="{00000000-0000-0000-0000-000000000000}"/>
+          </ac:spMkLst>
+        </pc:spChg>
+        <pc:grpChg chg="add del">
+          <ac:chgData name="Lieske, Sydney" userId="S::slieske7743@floridapoly.edu::96117bc7-a41d-4081-8f75-0129871cf8a3" providerId="AD" clId="Web-{05489FB6-1FEB-CF71-71B4-B11E8E4CC83D}" dt="2022-12-04T22:22:25.415" v="196"/>
+          <ac:grpSpMkLst>
+            <pc:docMk/>
+            <pc:sldMk cId="4247086857" sldId="268"/>
+            <ac:grpSpMk id="5" creationId="{B24D52D3-63AE-6AB9-65DC-D03F0F5F5694}"/>
+          </ac:grpSpMkLst>
+        </pc:grpChg>
+        <pc:grpChg chg="add del mod">
+          <ac:chgData name="Lieske, Sydney" userId="S::slieske7743@floridapoly.edu::96117bc7-a41d-4081-8f75-0129871cf8a3" providerId="AD" clId="Web-{05489FB6-1FEB-CF71-71B4-B11E8E4CC83D}" dt="2022-12-04T22:23:54.235" v="201"/>
+          <ac:grpSpMkLst>
+            <pc:docMk/>
+            <pc:sldMk cId="4247086857" sldId="268"/>
+            <ac:grpSpMk id="6" creationId="{961ABB2C-6595-7875-CAA3-F99C6CD0427C}"/>
+          </ac:grpSpMkLst>
+        </pc:grpChg>
+        <pc:picChg chg="add del mod">
+          <ac:chgData name="Lieske, Sydney" userId="S::slieske7743@floridapoly.edu::96117bc7-a41d-4081-8f75-0129871cf8a3" providerId="AD" clId="Web-{05489FB6-1FEB-CF71-71B4-B11E8E4CC83D}" dt="2022-12-04T22:04:59.122" v="150"/>
+          <ac:picMkLst>
+            <pc:docMk/>
+            <pc:sldMk cId="4247086857" sldId="268"/>
+            <ac:picMk id="2" creationId="{11F4A460-0711-E0B3-42A8-F5BB1DE76EC0}"/>
+          </ac:picMkLst>
+        </pc:picChg>
+        <pc:picChg chg="add mod topLvl">
+          <ac:chgData name="Lieske, Sydney" userId="S::slieske7743@floridapoly.edu::96117bc7-a41d-4081-8f75-0129871cf8a3" providerId="AD" clId="Web-{05489FB6-1FEB-CF71-71B4-B11E8E4CC83D}" dt="2022-12-04T22:23:54.235" v="201"/>
+          <ac:picMkLst>
+            <pc:docMk/>
+            <pc:sldMk cId="4247086857" sldId="268"/>
+            <ac:picMk id="3" creationId="{E26C89A5-8CE5-8767-4528-57FFDEE8BABE}"/>
+          </ac:picMkLst>
+        </pc:picChg>
+        <pc:picChg chg="add mod topLvl">
+          <ac:chgData name="Lieske, Sydney" userId="S::slieske7743@floridapoly.edu::96117bc7-a41d-4081-8f75-0129871cf8a3" providerId="AD" clId="Web-{05489FB6-1FEB-CF71-71B4-B11E8E4CC83D}" dt="2022-12-04T22:24:14.532" v="204" actId="1076"/>
+          <ac:picMkLst>
+            <pc:docMk/>
+            <pc:sldMk cId="4247086857" sldId="268"/>
+            <ac:picMk id="4" creationId="{EEC0FA27-B2EF-8909-32CE-C42BF3728CDD}"/>
+          </ac:picMkLst>
+        </pc:picChg>
+      </pc:sldChg>
+      <pc:sldChg chg="addSp delSp modSp add mod replId modClrScheme addCm delCm chgLayout">
+        <pc:chgData name="Lieske, Sydney" userId="S::slieske7743@floridapoly.edu::96117bc7-a41d-4081-8f75-0129871cf8a3" providerId="AD" clId="Web-{05489FB6-1FEB-CF71-71B4-B11E8E4CC83D}" dt="2022-12-04T23:42:40.480" v="506" actId="1076"/>
+        <pc:sldMkLst>
+          <pc:docMk/>
+          <pc:sldMk cId="56468286" sldId="269"/>
+        </pc:sldMkLst>
+        <pc:spChg chg="add del mod ord">
+          <ac:chgData name="Lieske, Sydney" userId="S::slieske7743@floridapoly.edu::96117bc7-a41d-4081-8f75-0129871cf8a3" providerId="AD" clId="Web-{05489FB6-1FEB-CF71-71B4-B11E8E4CC83D}" dt="2022-12-04T22:34:10.075" v="366"/>
+          <ac:spMkLst>
+            <pc:docMk/>
+            <pc:sldMk cId="56468286" sldId="269"/>
+            <ac:spMk id="5" creationId="{4D1F6FCE-A64B-B08F-F80D-7F432D9E54CE}"/>
+          </ac:spMkLst>
+        </pc:spChg>
+        <pc:spChg chg="add del mod ord">
+          <ac:chgData name="Lieske, Sydney" userId="S::slieske7743@floridapoly.edu::96117bc7-a41d-4081-8f75-0129871cf8a3" providerId="AD" clId="Web-{05489FB6-1FEB-CF71-71B4-B11E8E4CC83D}" dt="2022-12-04T22:34:10.075" v="366"/>
+          <ac:spMkLst>
+            <pc:docMk/>
+            <pc:sldMk cId="56468286" sldId="269"/>
+            <ac:spMk id="6" creationId="{9B07B802-8EAF-0BD8-FC6F-808E63C4C158}"/>
+          </ac:spMkLst>
+        </pc:spChg>
+        <pc:spChg chg="add del mod ord">
+          <ac:chgData name="Lieske, Sydney" userId="S::slieske7743@floridapoly.edu::96117bc7-a41d-4081-8f75-0129871cf8a3" providerId="AD" clId="Web-{05489FB6-1FEB-CF71-71B4-B11E8E4CC83D}" dt="2022-12-04T22:34:10.075" v="366"/>
+          <ac:spMkLst>
+            <pc:docMk/>
+            <pc:sldMk cId="56468286" sldId="269"/>
+            <ac:spMk id="7" creationId="{53C280DF-E77A-15C4-28C7-0C3D59232614}"/>
+          </ac:spMkLst>
+        </pc:spChg>
+        <pc:spChg chg="mod ord">
+          <ac:chgData name="Lieske, Sydney" userId="S::slieske7743@floridapoly.edu::96117bc7-a41d-4081-8f75-0129871cf8a3" providerId="AD" clId="Web-{05489FB6-1FEB-CF71-71B4-B11E8E4CC83D}" dt="2022-12-04T23:42:40.480" v="506" actId="1076"/>
+          <ac:spMkLst>
+            <pc:docMk/>
+            <pc:sldMk cId="56468286" sldId="269"/>
+            <ac:spMk id="307" creationId="{00000000-0000-0000-0000-000000000000}"/>
+          </ac:spMkLst>
+        </pc:spChg>
+        <pc:picChg chg="add mod">
+          <ac:chgData name="Lieske, Sydney" userId="S::slieske7743@floridapoly.edu::96117bc7-a41d-4081-8f75-0129871cf8a3" providerId="AD" clId="Web-{05489FB6-1FEB-CF71-71B4-B11E8E4CC83D}" dt="2022-12-04T23:42:37.340" v="505" actId="1076"/>
+          <ac:picMkLst>
+            <pc:docMk/>
+            <pc:sldMk cId="56468286" sldId="269"/>
+            <ac:picMk id="2" creationId="{0E58E20D-06A2-316C-CBD8-3088085A03A1}"/>
+          </ac:picMkLst>
+        </pc:picChg>
+        <pc:picChg chg="del">
+          <ac:chgData name="Lieske, Sydney" userId="S::slieske7743@floridapoly.edu::96117bc7-a41d-4081-8f75-0129871cf8a3" providerId="AD" clId="Web-{05489FB6-1FEB-CF71-71B4-B11E8E4CC83D}" dt="2022-12-04T22:24:19.064" v="206"/>
+          <ac:picMkLst>
+            <pc:docMk/>
+            <pc:sldMk cId="56468286" sldId="269"/>
+            <ac:picMk id="3" creationId="{E26C89A5-8CE5-8767-4528-57FFDEE8BABE}"/>
+          </ac:picMkLst>
+        </pc:picChg>
+        <pc:picChg chg="del">
+          <ac:chgData name="Lieske, Sydney" userId="S::slieske7743@floridapoly.edu::96117bc7-a41d-4081-8f75-0129871cf8a3" providerId="AD" clId="Web-{05489FB6-1FEB-CF71-71B4-B11E8E4CC83D}" dt="2022-12-04T22:24:19.470" v="207"/>
+          <ac:picMkLst>
+            <pc:docMk/>
+            <pc:sldMk cId="56468286" sldId="269"/>
+            <ac:picMk id="4" creationId="{EEC0FA27-B2EF-8909-32CE-C42BF3728CDD}"/>
+          </ac:picMkLst>
+        </pc:picChg>
+      </pc:sldChg>
+      <pc:sldChg chg="addSp delSp modSp add mod replId modClrScheme addCm chgLayout">
+        <pc:chgData name="Lieske, Sydney" userId="S::slieske7743@floridapoly.edu::96117bc7-a41d-4081-8f75-0129871cf8a3" providerId="AD" clId="Web-{05489FB6-1FEB-CF71-71B4-B11E8E4CC83D}" dt="2022-12-04T23:04:53.847" v="435" actId="1076"/>
+        <pc:sldMkLst>
+          <pc:docMk/>
+          <pc:sldMk cId="981701434" sldId="270"/>
+        </pc:sldMkLst>
+        <pc:spChg chg="add del mod ord">
+          <ac:chgData name="Lieske, Sydney" userId="S::slieske7743@floridapoly.edu::96117bc7-a41d-4081-8f75-0129871cf8a3" providerId="AD" clId="Web-{05489FB6-1FEB-CF71-71B4-B11E8E4CC83D}" dt="2022-12-04T22:32:18.932" v="313"/>
+          <ac:spMkLst>
+            <pc:docMk/>
+            <pc:sldMk cId="981701434" sldId="270"/>
+            <ac:spMk id="5" creationId="{0924E815-B146-5C6F-C89A-EE61FD9229F8}"/>
+          </ac:spMkLst>
+        </pc:spChg>
+        <pc:spChg chg="add del mod ord">
+          <ac:chgData name="Lieske, Sydney" userId="S::slieske7743@floridapoly.edu::96117bc7-a41d-4081-8f75-0129871cf8a3" providerId="AD" clId="Web-{05489FB6-1FEB-CF71-71B4-B11E8E4CC83D}" dt="2022-12-04T22:32:08.604" v="311"/>
+          <ac:spMkLst>
+            <pc:docMk/>
+            <pc:sldMk cId="981701434" sldId="270"/>
+            <ac:spMk id="6" creationId="{3EA02ED0-9859-C6A6-30CD-6984D9B9527F}"/>
+          </ac:spMkLst>
+        </pc:spChg>
+        <pc:spChg chg="add del mod ord">
+          <ac:chgData name="Lieske, Sydney" userId="S::slieske7743@floridapoly.edu::96117bc7-a41d-4081-8f75-0129871cf8a3" providerId="AD" clId="Web-{05489FB6-1FEB-CF71-71B4-B11E8E4CC83D}" dt="2022-12-04T22:32:08.604" v="311"/>
+          <ac:spMkLst>
+            <pc:docMk/>
+            <pc:sldMk cId="981701434" sldId="270"/>
+            <ac:spMk id="7" creationId="{91B91379-8046-8AC8-BCB9-C725BDB11429}"/>
+          </ac:spMkLst>
+        </pc:spChg>
+        <pc:spChg chg="add del mod ord">
+          <ac:chgData name="Lieske, Sydney" userId="S::slieske7743@floridapoly.edu::96117bc7-a41d-4081-8f75-0129871cf8a3" providerId="AD" clId="Web-{05489FB6-1FEB-CF71-71B4-B11E8E4CC83D}" dt="2022-12-04T22:32:08.604" v="311"/>
+          <ac:spMkLst>
+            <pc:docMk/>
+            <pc:sldMk cId="981701434" sldId="270"/>
+            <ac:spMk id="8" creationId="{C588E912-5B97-21E6-0385-23382D290A9C}"/>
+          </ac:spMkLst>
+        </pc:spChg>
+        <pc:spChg chg="add del mod ord">
+          <ac:chgData name="Lieske, Sydney" userId="S::slieske7743@floridapoly.edu::96117bc7-a41d-4081-8f75-0129871cf8a3" providerId="AD" clId="Web-{05489FB6-1FEB-CF71-71B4-B11E8E4CC83D}" dt="2022-12-04T22:32:24.620" v="316"/>
+          <ac:spMkLst>
+            <pc:docMk/>
+            <pc:sldMk cId="981701434" sldId="270"/>
+            <ac:spMk id="9" creationId="{3E2C4330-9F5C-3F2D-FA97-DA4E03EF5EDF}"/>
+          </ac:spMkLst>
+        </pc:spChg>
+        <pc:spChg chg="add mod ord">
+          <ac:chgData name="Lieske, Sydney" userId="S::slieske7743@floridapoly.edu::96117bc7-a41d-4081-8f75-0129871cf8a3" providerId="AD" clId="Web-{05489FB6-1FEB-CF71-71B4-B11E8E4CC83D}" dt="2022-12-04T22:33:23.105" v="364" actId="20577"/>
+          <ac:spMkLst>
+            <pc:docMk/>
+            <pc:sldMk cId="981701434" sldId="270"/>
+            <ac:spMk id="10" creationId="{61033EE3-83F7-7888-2CFC-985B49D4299B}"/>
+          </ac:spMkLst>
+        </pc:spChg>
+        <pc:spChg chg="add mod ord">
+          <ac:chgData name="Lieske, Sydney" userId="S::slieske7743@floridapoly.edu::96117bc7-a41d-4081-8f75-0129871cf8a3" providerId="AD" clId="Web-{05489FB6-1FEB-CF71-71B4-B11E8E4CC83D}" dt="2022-12-04T22:33:12.808" v="346" actId="20577"/>
+          <ac:spMkLst>
+            <pc:docMk/>
+            <pc:sldMk cId="981701434" sldId="270"/>
+            <ac:spMk id="11" creationId="{E5B45E23-91CA-672E-05D0-2498094ABC60}"/>
+          </ac:spMkLst>
+        </pc:spChg>
+        <pc:spChg chg="add del mod ord">
+          <ac:chgData name="Lieske, Sydney" userId="S::slieske7743@floridapoly.edu::96117bc7-a41d-4081-8f75-0129871cf8a3" providerId="AD" clId="Web-{05489FB6-1FEB-CF71-71B4-B11E8E4CC83D}" dt="2022-12-04T22:32:39.011" v="321"/>
+          <ac:spMkLst>
+            <pc:docMk/>
+            <pc:sldMk cId="981701434" sldId="270"/>
+            <ac:spMk id="12" creationId="{49835EC7-3CDF-9C34-3CD6-7A02191FF0ED}"/>
+          </ac:spMkLst>
+        </pc:spChg>
+        <pc:spChg chg="mod ord">
+          <ac:chgData name="Lieske, Sydney" userId="S::slieske7743@floridapoly.edu::96117bc7-a41d-4081-8f75-0129871cf8a3" providerId="AD" clId="Web-{05489FB6-1FEB-CF71-71B4-B11E8E4CC83D}" dt="2022-12-04T23:04:53.847" v="435" actId="1076"/>
+          <ac:spMkLst>
+            <pc:docMk/>
+            <pc:sldMk cId="981701434" sldId="270"/>
+            <ac:spMk id="307" creationId="{00000000-0000-0000-0000-000000000000}"/>
+          </ac:spMkLst>
+        </pc:spChg>
+        <pc:picChg chg="del">
+          <ac:chgData name="Lieske, Sydney" userId="S::slieske7743@floridapoly.edu::96117bc7-a41d-4081-8f75-0129871cf8a3" providerId="AD" clId="Web-{05489FB6-1FEB-CF71-71B4-B11E8E4CC83D}" dt="2022-12-04T22:25:24.252" v="213"/>
+          <ac:picMkLst>
+            <pc:docMk/>
+            <pc:sldMk cId="981701434" sldId="270"/>
+            <ac:picMk id="2" creationId="{0E58E20D-06A2-316C-CBD8-3088085A03A1}"/>
+          </ac:picMkLst>
+        </pc:picChg>
+        <pc:picChg chg="add mod">
+          <ac:chgData name="Lieske, Sydney" userId="S::slieske7743@floridapoly.edu::96117bc7-a41d-4081-8f75-0129871cf8a3" providerId="AD" clId="Web-{05489FB6-1FEB-CF71-71B4-B11E8E4CC83D}" dt="2022-12-04T22:32:56.339" v="323" actId="1076"/>
+          <ac:picMkLst>
+            <pc:docMk/>
+            <pc:sldMk cId="981701434" sldId="270"/>
+            <ac:picMk id="3" creationId="{5D9DABCF-56D1-C184-F40A-5F7997073861}"/>
+          </ac:picMkLst>
+        </pc:picChg>
+        <pc:picChg chg="add del mod">
+          <ac:chgData name="Lieske, Sydney" userId="S::slieske7743@floridapoly.edu::96117bc7-a41d-4081-8f75-0129871cf8a3" providerId="AD" clId="Web-{05489FB6-1FEB-CF71-71B4-B11E8E4CC83D}" dt="2022-12-04T22:33:01.199" v="325" actId="1076"/>
+          <ac:picMkLst>
+            <pc:docMk/>
+            <pc:sldMk cId="981701434" sldId="270"/>
+            <ac:picMk id="4" creationId="{5A6E3BCA-09CC-DAF8-ACE2-8267932038DD}"/>
+          </ac:picMkLst>
+        </pc:picChg>
+      </pc:sldChg>
+      <pc:sldChg chg="addSp delSp modSp add replId addCm">
+        <pc:chgData name="Lieske, Sydney" userId="S::slieske7743@floridapoly.edu::96117bc7-a41d-4081-8f75-0129871cf8a3" providerId="AD" clId="Web-{05489FB6-1FEB-CF71-71B4-B11E8E4CC83D}" dt="2022-12-04T23:40:57.822" v="500"/>
+        <pc:sldMkLst>
+          <pc:docMk/>
+          <pc:sldMk cId="3057151301" sldId="271"/>
+        </pc:sldMkLst>
+        <pc:picChg chg="del">
+          <ac:chgData name="Lieske, Sydney" userId="S::slieske7743@floridapoly.edu::96117bc7-a41d-4081-8f75-0129871cf8a3" providerId="AD" clId="Web-{05489FB6-1FEB-CF71-71B4-B11E8E4CC83D}" dt="2022-12-04T22:25:27.643" v="215"/>
+          <ac:picMkLst>
+            <pc:docMk/>
+            <pc:sldMk cId="3057151301" sldId="271"/>
+            <ac:picMk id="2" creationId="{0E58E20D-06A2-316C-CBD8-3088085A03A1}"/>
+          </ac:picMkLst>
+        </pc:picChg>
+        <pc:picChg chg="add mod">
+          <ac:chgData name="Lieske, Sydney" userId="S::slieske7743@floridapoly.edu::96117bc7-a41d-4081-8f75-0129871cf8a3" providerId="AD" clId="Web-{05489FB6-1FEB-CF71-71B4-B11E8E4CC83D}" dt="2022-12-04T22:26:39.832" v="240" actId="1076"/>
+          <ac:picMkLst>
+            <pc:docMk/>
+            <pc:sldMk cId="3057151301" sldId="271"/>
+            <ac:picMk id="3" creationId="{06777672-8632-294E-E84C-520DBA17C95C}"/>
+          </ac:picMkLst>
+        </pc:picChg>
+        <pc:picChg chg="add mod">
+          <ac:chgData name="Lieske, Sydney" userId="S::slieske7743@floridapoly.edu::96117bc7-a41d-4081-8f75-0129871cf8a3" providerId="AD" clId="Web-{05489FB6-1FEB-CF71-71B4-B11E8E4CC83D}" dt="2022-12-04T22:29:01.991" v="293" actId="1076"/>
+          <ac:picMkLst>
+            <pc:docMk/>
+            <pc:sldMk cId="3057151301" sldId="271"/>
+            <ac:picMk id="4" creationId="{113D006C-5EC6-047F-CCC1-C44C4918AD64}"/>
+          </ac:picMkLst>
+        </pc:picChg>
+      </pc:sldChg>
+      <pc:sldChg chg="addSp delSp modSp add replId addCm delCm">
+        <pc:chgData name="Lieske, Sydney" userId="S::slieske7743@floridapoly.edu::96117bc7-a41d-4081-8f75-0129871cf8a3" providerId="AD" clId="Web-{05489FB6-1FEB-CF71-71B4-B11E8E4CC83D}" dt="2022-12-04T23:39:51.524" v="499" actId="1076"/>
+        <pc:sldMkLst>
+          <pc:docMk/>
+          <pc:sldMk cId="1123019891" sldId="272"/>
+        </pc:sldMkLst>
+        <pc:spChg chg="mod">
+          <ac:chgData name="Lieske, Sydney" userId="S::slieske7743@floridapoly.edu::96117bc7-a41d-4081-8f75-0129871cf8a3" providerId="AD" clId="Web-{05489FB6-1FEB-CF71-71B4-B11E8E4CC83D}" dt="2022-12-04T22:27:33.989" v="250" actId="20577"/>
+          <ac:spMkLst>
+            <pc:docMk/>
+            <pc:sldMk cId="1123019891" sldId="272"/>
+            <ac:spMk id="307" creationId="{00000000-0000-0000-0000-000000000000}"/>
+          </ac:spMkLst>
+        </pc:spChg>
+        <pc:picChg chg="add mod">
+          <ac:chgData name="Lieske, Sydney" userId="S::slieske7743@floridapoly.edu::96117bc7-a41d-4081-8f75-0129871cf8a3" providerId="AD" clId="Web-{05489FB6-1FEB-CF71-71B4-B11E8E4CC83D}" dt="2022-12-04T23:39:51.524" v="499" actId="1076"/>
+          <ac:picMkLst>
+            <pc:docMk/>
+            <pc:sldMk cId="1123019891" sldId="272"/>
+            <ac:picMk id="2" creationId="{7C87EA09-D6F4-B6F9-BC1F-1F072844B30E}"/>
+          </ac:picMkLst>
+        </pc:picChg>
+        <pc:picChg chg="del">
+          <ac:chgData name="Lieske, Sydney" userId="S::slieske7743@floridapoly.edu::96117bc7-a41d-4081-8f75-0129871cf8a3" providerId="AD" clId="Web-{05489FB6-1FEB-CF71-71B4-B11E8E4CC83D}" dt="2022-12-04T22:27:18.489" v="244"/>
+          <ac:picMkLst>
+            <pc:docMk/>
+            <pc:sldMk cId="1123019891" sldId="272"/>
+            <ac:picMk id="3" creationId="{06777672-8632-294E-E84C-520DBA17C95C}"/>
+          </ac:picMkLst>
+        </pc:picChg>
+        <pc:picChg chg="del">
+          <ac:chgData name="Lieske, Sydney" userId="S::slieske7743@floridapoly.edu::96117bc7-a41d-4081-8f75-0129871cf8a3" providerId="AD" clId="Web-{05489FB6-1FEB-CF71-71B4-B11E8E4CC83D}" dt="2022-12-04T22:27:18.880" v="245"/>
+          <ac:picMkLst>
+            <pc:docMk/>
+            <pc:sldMk cId="1123019891" sldId="272"/>
+            <ac:picMk id="4" creationId="{113D006C-5EC6-047F-CCC1-C44C4918AD64}"/>
+          </ac:picMkLst>
+        </pc:picChg>
+        <pc:picChg chg="add del mod">
+          <ac:chgData name="Lieske, Sydney" userId="S::slieske7743@floridapoly.edu::96117bc7-a41d-4081-8f75-0129871cf8a3" providerId="AD" clId="Web-{05489FB6-1FEB-CF71-71B4-B11E8E4CC83D}" dt="2022-12-04T22:27:47.302" v="254"/>
+          <ac:picMkLst>
+            <pc:docMk/>
+            <pc:sldMk cId="1123019891" sldId="272"/>
+            <ac:picMk id="5" creationId="{05A685D8-4519-4123-444A-3751C0D81F4D}"/>
+          </ac:picMkLst>
+        </pc:picChg>
+        <pc:picChg chg="add del mod">
+          <ac:chgData name="Lieske, Sydney" userId="S::slieske7743@floridapoly.edu::96117bc7-a41d-4081-8f75-0129871cf8a3" providerId="AD" clId="Web-{05489FB6-1FEB-CF71-71B4-B11E8E4CC83D}" dt="2022-12-04T22:28:06.599" v="259"/>
+          <ac:picMkLst>
+            <pc:docMk/>
+            <pc:sldMk cId="1123019891" sldId="272"/>
+            <ac:picMk id="6" creationId="{E3FE766E-C6A1-D0B1-CAA0-E9B799630443}"/>
+          </ac:picMkLst>
+        </pc:picChg>
+      </pc:sldChg>
+      <pc:sldChg chg="addSp delSp modSp add ord replId">
+        <pc:chgData name="Lieske, Sydney" userId="S::slieske7743@floridapoly.edu::96117bc7-a41d-4081-8f75-0129871cf8a3" providerId="AD" clId="Web-{05489FB6-1FEB-CF71-71B4-B11E8E4CC83D}" dt="2022-12-04T22:44:19.712" v="420" actId="1076"/>
+        <pc:sldMkLst>
+          <pc:docMk/>
+          <pc:sldMk cId="3887583839" sldId="273"/>
+        </pc:sldMkLst>
+        <pc:spChg chg="add mod">
+          <ac:chgData name="Lieske, Sydney" userId="S::slieske7743@floridapoly.edu::96117bc7-a41d-4081-8f75-0129871cf8a3" providerId="AD" clId="Web-{05489FB6-1FEB-CF71-71B4-B11E8E4CC83D}" dt="2022-12-04T22:44:19.712" v="420" actId="1076"/>
+          <ac:spMkLst>
+            <pc:docMk/>
+            <pc:sldMk cId="3887583839" sldId="273"/>
+            <ac:spMk id="6" creationId="{0728194B-B26D-B639-B2CC-AA8142150D26}"/>
+          </ac:spMkLst>
+        </pc:spChg>
+        <pc:spChg chg="mod">
+          <ac:chgData name="Lieske, Sydney" userId="S::slieske7743@floridapoly.edu::96117bc7-a41d-4081-8f75-0129871cf8a3" providerId="AD" clId="Web-{05489FB6-1FEB-CF71-71B4-B11E8E4CC83D}" dt="2022-12-04T22:44:00.258" v="413" actId="20577"/>
+          <ac:spMkLst>
+            <pc:docMk/>
+            <pc:sldMk cId="3887583839" sldId="273"/>
+            <ac:spMk id="307" creationId="{00000000-0000-0000-0000-000000000000}"/>
+          </ac:spMkLst>
+        </pc:spChg>
+        <pc:picChg chg="add mod">
+          <ac:chgData name="Lieske, Sydney" userId="S::slieske7743@floridapoly.edu::96117bc7-a41d-4081-8f75-0129871cf8a3" providerId="AD" clId="Web-{05489FB6-1FEB-CF71-71B4-B11E8E4CC83D}" dt="2022-12-04T22:44:08.946" v="416" actId="1076"/>
+          <ac:picMkLst>
+            <pc:docMk/>
+            <pc:sldMk cId="3887583839" sldId="273"/>
+            <ac:picMk id="2" creationId="{5D9B8F79-7DBF-1869-6F5B-74E865E41B04}"/>
+          </ac:picMkLst>
+        </pc:picChg>
+        <pc:picChg chg="del">
+          <ac:chgData name="Lieske, Sydney" userId="S::slieske7743@floridapoly.edu::96117bc7-a41d-4081-8f75-0129871cf8a3" providerId="AD" clId="Web-{05489FB6-1FEB-CF71-71B4-B11E8E4CC83D}" dt="2022-12-04T22:43:50.570" v="396"/>
+          <ac:picMkLst>
+            <pc:docMk/>
+            <pc:sldMk cId="3887583839" sldId="273"/>
+            <ac:picMk id="3" creationId="{E26C89A5-8CE5-8767-4528-57FFDEE8BABE}"/>
+          </ac:picMkLst>
+        </pc:picChg>
+        <pc:picChg chg="del">
+          <ac:chgData name="Lieske, Sydney" userId="S::slieske7743@floridapoly.edu::96117bc7-a41d-4081-8f75-0129871cf8a3" providerId="AD" clId="Web-{05489FB6-1FEB-CF71-71B4-B11E8E4CC83D}" dt="2022-12-04T22:43:51.102" v="397"/>
+          <ac:picMkLst>
+            <pc:docMk/>
+            <pc:sldMk cId="3887583839" sldId="273"/>
+            <ac:picMk id="4" creationId="{EEC0FA27-B2EF-8909-32CE-C42BF3728CDD}"/>
+          </ac:picMkLst>
+        </pc:picChg>
+      </pc:sldChg>
+    </pc:docChg>
+  </pc:docChgLst>
+  <pc:docChgLst>
+    <pc:chgData name="Lieske, Sydney" userId="S::slieske7743@floridapoly.edu::96117bc7-a41d-4081-8f75-0129871cf8a3" providerId="AD" clId="Web-{1C7149D2-DA33-9384-606B-F3D2E4C570E8}"/>
+    <pc:docChg chg="modSld">
+      <pc:chgData name="Lieske, Sydney" userId="S::slieske7743@floridapoly.edu::96117bc7-a41d-4081-8f75-0129871cf8a3" providerId="AD" clId="Web-{1C7149D2-DA33-9384-606B-F3D2E4C570E8}" dt="2022-12-05T02:16:11.553" v="27"/>
+      <pc:docMkLst>
+        <pc:docMk/>
+      </pc:docMkLst>
+      <pc:sldChg chg="addSp delSp modSp">
+        <pc:chgData name="Lieske, Sydney" userId="S::slieske7743@floridapoly.edu::96117bc7-a41d-4081-8f75-0129871cf8a3" providerId="AD" clId="Web-{1C7149D2-DA33-9384-606B-F3D2E4C570E8}" dt="2022-12-05T01:34:52.733" v="2"/>
+        <pc:sldMkLst>
+          <pc:docMk/>
+          <pc:sldMk cId="0" sldId="257"/>
+        </pc:sldMkLst>
+        <pc:picChg chg="add del mod">
+          <ac:chgData name="Lieske, Sydney" userId="S::slieske7743@floridapoly.edu::96117bc7-a41d-4081-8f75-0129871cf8a3" providerId="AD" clId="Web-{1C7149D2-DA33-9384-606B-F3D2E4C570E8}" dt="2022-12-05T01:34:52.733" v="2"/>
+          <ac:picMkLst>
+            <pc:docMk/>
+            <pc:sldMk cId="0" sldId="257"/>
+            <ac:picMk id="2" creationId="{488B158C-64B3-A78F-C144-5523E708C841}"/>
+          </ac:picMkLst>
+        </pc:picChg>
+      </pc:sldChg>
+      <pc:sldChg chg="modSp">
+        <pc:chgData name="Lieske, Sydney" userId="S::slieske7743@floridapoly.edu::96117bc7-a41d-4081-8f75-0129871cf8a3" providerId="AD" clId="Web-{1C7149D2-DA33-9384-606B-F3D2E4C570E8}" dt="2022-12-05T02:15:02.598" v="26" actId="20577"/>
+        <pc:sldMkLst>
+          <pc:docMk/>
+          <pc:sldMk cId="0" sldId="261"/>
+        </pc:sldMkLst>
+        <pc:spChg chg="mod">
+          <ac:chgData name="Lieske, Sydney" userId="S::slieske7743@floridapoly.edu::96117bc7-a41d-4081-8f75-0129871cf8a3" providerId="AD" clId="Web-{1C7149D2-DA33-9384-606B-F3D2E4C570E8}" dt="2022-12-05T02:15:02.598" v="26" actId="20577"/>
+          <ac:spMkLst>
+            <pc:docMk/>
+            <pc:sldMk cId="0" sldId="261"/>
+            <ac:spMk id="312" creationId="{00000000-0000-0000-0000-000000000000}"/>
+          </ac:spMkLst>
+        </pc:spChg>
+      </pc:sldChg>
+      <pc:sldChg chg="modSp">
+        <pc:chgData name="Lieske, Sydney" userId="S::slieske7743@floridapoly.edu::96117bc7-a41d-4081-8f75-0129871cf8a3" providerId="AD" clId="Web-{1C7149D2-DA33-9384-606B-F3D2E4C570E8}" dt="2022-12-05T02:00:10.610" v="10" actId="1076"/>
+        <pc:sldMkLst>
+          <pc:docMk/>
+          <pc:sldMk cId="628800396" sldId="266"/>
+        </pc:sldMkLst>
+        <pc:spChg chg="mod">
+          <ac:chgData name="Lieske, Sydney" userId="S::slieske7743@floridapoly.edu::96117bc7-a41d-4081-8f75-0129871cf8a3" providerId="AD" clId="Web-{1C7149D2-DA33-9384-606B-F3D2E4C570E8}" dt="2022-12-05T02:00:10.610" v="10" actId="1076"/>
+          <ac:spMkLst>
+            <pc:docMk/>
+            <pc:sldMk cId="628800396" sldId="266"/>
+            <ac:spMk id="4" creationId="{477A327B-086B-9793-9F15-7075FA80163E}"/>
+          </ac:spMkLst>
+        </pc:spChg>
+      </pc:sldChg>
+      <pc:sldChg chg="modSp">
+        <pc:chgData name="Lieske, Sydney" userId="S::slieske7743@floridapoly.edu::96117bc7-a41d-4081-8f75-0129871cf8a3" providerId="AD" clId="Web-{1C7149D2-DA33-9384-606B-F3D2E4C570E8}" dt="2022-12-05T02:01:14.033" v="13" actId="1076"/>
+        <pc:sldMkLst>
+          <pc:docMk/>
+          <pc:sldMk cId="56468286" sldId="269"/>
+        </pc:sldMkLst>
+        <pc:picChg chg="mod">
+          <ac:chgData name="Lieske, Sydney" userId="S::slieske7743@floridapoly.edu::96117bc7-a41d-4081-8f75-0129871cf8a3" providerId="AD" clId="Web-{1C7149D2-DA33-9384-606B-F3D2E4C570E8}" dt="2022-12-05T02:01:14.033" v="13" actId="1076"/>
+          <ac:picMkLst>
+            <pc:docMk/>
+            <pc:sldMk cId="56468286" sldId="269"/>
+            <ac:picMk id="2" creationId="{0E58E20D-06A2-316C-CBD8-3088085A03A1}"/>
+          </ac:picMkLst>
+        </pc:picChg>
+      </pc:sldChg>
+      <pc:sldChg chg="addSp modSp delCm">
+        <pc:chgData name="Lieske, Sydney" userId="S::slieske7743@floridapoly.edu::96117bc7-a41d-4081-8f75-0129871cf8a3" providerId="AD" clId="Web-{1C7149D2-DA33-9384-606B-F3D2E4C570E8}" dt="2022-12-05T02:16:11.553" v="27"/>
+        <pc:sldMkLst>
+          <pc:docMk/>
+          <pc:sldMk cId="981701434" sldId="270"/>
+        </pc:sldMkLst>
+        <pc:picChg chg="add mod">
+          <ac:chgData name="Lieske, Sydney" userId="S::slieske7743@floridapoly.edu::96117bc7-a41d-4081-8f75-0129871cf8a3" providerId="AD" clId="Web-{1C7149D2-DA33-9384-606B-F3D2E4C570E8}" dt="2022-12-05T02:04:14.756" v="16" actId="1076"/>
+          <ac:picMkLst>
+            <pc:docMk/>
+            <pc:sldMk cId="981701434" sldId="270"/>
+            <ac:picMk id="2" creationId="{B73C6652-02FA-660B-F107-683EA3D0403C}"/>
+          </ac:picMkLst>
+        </pc:picChg>
+        <pc:picChg chg="add mod">
+          <ac:chgData name="Lieske, Sydney" userId="S::slieske7743@floridapoly.edu::96117bc7-a41d-4081-8f75-0129871cf8a3" providerId="AD" clId="Web-{1C7149D2-DA33-9384-606B-F3D2E4C570E8}" dt="2022-12-05T02:04:54.460" v="21" actId="1076"/>
+          <ac:picMkLst>
+            <pc:docMk/>
+            <pc:sldMk cId="981701434" sldId="270"/>
+            <ac:picMk id="5" creationId="{894EF507-CDCD-ED85-5730-70AB95D7D9B4}"/>
+          </ac:picMkLst>
+        </pc:picChg>
+      </pc:sldChg>
+      <pc:sldChg chg="addSp delSp modSp mod modClrScheme chgLayout">
+        <pc:chgData name="Lieske, Sydney" userId="S::slieske7743@floridapoly.edu::96117bc7-a41d-4081-8f75-0129871cf8a3" providerId="AD" clId="Web-{1C7149D2-DA33-9384-606B-F3D2E4C570E8}" dt="2022-12-05T02:00:36.923" v="12" actId="1076"/>
+        <pc:sldMkLst>
+          <pc:docMk/>
+          <pc:sldMk cId="3887583839" sldId="273"/>
+        </pc:sldMkLst>
+        <pc:spChg chg="add del mod">
+          <ac:chgData name="Lieske, Sydney" userId="S::slieske7743@floridapoly.edu::96117bc7-a41d-4081-8f75-0129871cf8a3" providerId="AD" clId="Web-{1C7149D2-DA33-9384-606B-F3D2E4C570E8}" dt="2022-12-05T02:00:34.360" v="11"/>
+          <ac:spMkLst>
+            <pc:docMk/>
+            <pc:sldMk cId="3887583839" sldId="273"/>
+            <ac:spMk id="6" creationId="{0728194B-B26D-B639-B2CC-AA8142150D26}"/>
+          </ac:spMkLst>
+        </pc:spChg>
+        <pc:spChg chg="mod ord">
+          <ac:chgData name="Lieske, Sydney" userId="S::slieske7743@floridapoly.edu::96117bc7-a41d-4081-8f75-0129871cf8a3" providerId="AD" clId="Web-{1C7149D2-DA33-9384-606B-F3D2E4C570E8}" dt="2022-12-05T01:39:12.598" v="8"/>
+          <ac:spMkLst>
+            <pc:docMk/>
+            <pc:sldMk cId="3887583839" sldId="273"/>
+            <ac:spMk id="307" creationId="{00000000-0000-0000-0000-000000000000}"/>
+          </ac:spMkLst>
+        </pc:spChg>
+        <pc:picChg chg="mod">
+          <ac:chgData name="Lieske, Sydney" userId="S::slieske7743@floridapoly.edu::96117bc7-a41d-4081-8f75-0129871cf8a3" providerId="AD" clId="Web-{1C7149D2-DA33-9384-606B-F3D2E4C570E8}" dt="2022-12-05T02:00:36.923" v="12" actId="1076"/>
+          <ac:picMkLst>
+            <pc:docMk/>
+            <pc:sldMk cId="3887583839" sldId="273"/>
+            <ac:picMk id="2" creationId="{5D9B8F79-7DBF-1869-6F5B-74E865E41B04}"/>
+          </ac:picMkLst>
+        </pc:picChg>
+      </pc:sldChg>
+    </pc:docChg>
+  </pc:docChgLst>
+</pc:chgInfo>
 </file>
 
 <file path=ppt/notesMasters/notesMaster1.xml><?xml version="1.0" encoding="utf-8"?>
@@ -31881,7 +32870,7 @@
           <p:nvPr/>
         </p:nvPicPr>
         <p:blipFill>
-          <a:blip r:embed="rId4"/>
+          <a:blip r:embed="rId3"/>
           <a:stretch>
             <a:fillRect/>
           </a:stretch>
@@ -31911,7 +32900,7 @@
           <p:nvPr/>
         </p:nvPicPr>
         <p:blipFill>
-          <a:blip r:embed="rId5"/>
+          <a:blip r:embed="rId4"/>
           <a:stretch>
             <a:fillRect/>
           </a:stretch>
@@ -31936,11 +32925,6 @@
   <p:clrMapOvr>
     <a:masterClrMapping/>
   </p:clrMapOvr>
-  <p:extLst>
-    <p:ext uri="{6950BFC3-D8DA-4A85-94F7-54DA5524770B}">
-      <p188:commentRel xmlns:p188="http://schemas.microsoft.com/office/powerpoint/2018/8/main" r:id="rId3"/>
-    </p:ext>
-  </p:extLst>
 </p:sld>
 </file>
 
@@ -32359,7 +33343,7 @@
           <a:p>
             <a:r>
               <a:rPr lang="en"/>
-              <a:t>Source for Dataset</a:t>
+              <a:t>Sources for Dataset</a:t>
             </a:r>
             <a:endParaRPr lang="en-US"/>
           </a:p>
@@ -32742,37 +33726,64 @@
           </a:bodyPr>
           <a:lstStyle/>
           <a:p>
-            <a:pPr marL="425450" indent="-285750"/>
+            <a:pPr>
+              <a:buFont typeface="Cabin,Sans-Serif"/>
+            </a:pPr>
             <a:r>
               <a:rPr lang="en"/>
-              <a:t>Recognize the key factors that caused these accidents?</a:t>
+              <a:t>What is the distribution of accidents across the country?</a:t>
             </a:r>
             <a:endParaRPr lang="en-US"/>
           </a:p>
           <a:p>
-            <a:pPr marL="425450" indent="-285750"/>
+            <a:pPr>
+              <a:buFont typeface="Cabin,Sans-Serif"/>
+            </a:pPr>
             <a:r>
               <a:rPr lang="en"/>
-              <a:t>How can we use the insights from this analysis?</a:t>
+              <a:t>Which states have the most cases of accidents? Least?</a:t>
             </a:r>
             <a:endParaRPr lang="en-US"/>
           </a:p>
           <a:p>
-            <a:pPr marL="425450" indent="-285750"/>
+            <a:pPr>
+              <a:buFont typeface="Cabin,Sans-Serif"/>
+            </a:pPr>
             <a:r>
               <a:rPr lang="en"/>
-              <a:t>What else can we gain from this?</a:t>
+              <a:t>Which streets are the most accident prone?</a:t>
             </a:r>
             <a:endParaRPr lang="en-US"/>
           </a:p>
           <a:p>
-            <a:endParaRPr lang="en"/>
+            <a:pPr>
+              <a:buFont typeface="Cabin,Sans-Serif"/>
+            </a:pPr>
+            <a:r>
+              <a:rPr lang="en"/>
+              <a:t>Which months have the most accidents?</a:t>
+            </a:r>
+            <a:endParaRPr lang="en-US"/>
           </a:p>
           <a:p>
-            <a:pPr marL="139700" indent="0">
-              <a:buNone/>
+            <a:pPr>
+              <a:buFont typeface="Cabin,Sans-Serif"/>
             </a:pPr>
-            <a:endParaRPr lang="en"/>
+            <a:r>
+              <a:rPr lang="en"/>
+              <a:t>What time and day are safer to travel?</a:t>
+            </a:r>
+            <a:endParaRPr lang="en-US"/>
+          </a:p>
+          <a:p>
+            <a:pPr>
+              <a:buFont typeface="Cabin,Sans-Serif"/>
+            </a:pPr>
+            <a:r>
+              <a:rPr lang="en"/>
+              <a:t>What factors are most responsible for these accidents?</a:t>
+            </a:r>
+            <a:endParaRPr lang="en-US"/>
           </a:p>
         </p:txBody>
       </p:sp>
@@ -33088,37 +34099,10 @@
             </a:lvl9pPr>
           </a:lstStyle>
           <a:p>
-            <a:pPr>
-              <a:buFont typeface="Cabin,Sans-Serif"/>
-              <a:buChar char="○"/>
-            </a:pPr>
+            <a:pPr marL="425450" indent="-285750"/>
             <a:r>
               <a:rPr lang="en"/>
-              <a:t>What benefit does this analysis bring? </a:t>
-            </a:r>
-            <a:endParaRPr lang="en-US"/>
-          </a:p>
-          <a:p>
-            <a:pPr>
-              <a:spcBef>
-                <a:spcPts val="1200"/>
-              </a:spcBef>
-            </a:pPr>
-            <a:r>
-              <a:rPr lang="en"/>
-              <a:t>What time and day are safer to travel?</a:t>
-            </a:r>
-            <a:endParaRPr lang="en-US"/>
-          </a:p>
-          <a:p>
-            <a:pPr>
-              <a:spcBef>
-                <a:spcPts val="1200"/>
-              </a:spcBef>
-            </a:pPr>
-            <a:r>
-              <a:rPr lang="en"/>
-              <a:t>What factors are most responsible for these accidents?</a:t>
+              <a:t>During what weather conditions do the most accidents occur?</a:t>
             </a:r>
             <a:endParaRPr lang="en-US"/>
           </a:p>

</xml_diff>